<commit_message>
Updating presentation and finishing generating the test db.
</commit_message>
<xml_diff>
--- a/DatabaseDesign/DatabaseManagementSystems/Presentation_week40.pptx
+++ b/DatabaseDesign/DatabaseManagementSystems/Presentation_week40.pptx
@@ -8,11 +8,12 @@
     <p:sldId id="256" r:id="rId2"/>
     <p:sldId id="262" r:id="rId3"/>
     <p:sldId id="265" r:id="rId4"/>
-    <p:sldId id="257" r:id="rId5"/>
-    <p:sldId id="258" r:id="rId6"/>
-    <p:sldId id="263" r:id="rId7"/>
-    <p:sldId id="264" r:id="rId8"/>
-    <p:sldId id="260" r:id="rId9"/>
+    <p:sldId id="266" r:id="rId5"/>
+    <p:sldId id="257" r:id="rId6"/>
+    <p:sldId id="258" r:id="rId7"/>
+    <p:sldId id="263" r:id="rId8"/>
+    <p:sldId id="264" r:id="rId9"/>
+    <p:sldId id="260" r:id="rId10"/>
   </p:sldIdLst>
   <p:sldSz cx="9144000" cy="6858000" type="screen4x3"/>
   <p:notesSz cx="6858000" cy="9144000"/>
@@ -3889,23 +3890,7 @@
           <a:p>
             <a:r>
               <a:rPr lang="da-DK" dirty="0" smtClean="0"/>
-              <a:t>Test DB (- </a:t>
-            </a:r>
-            <a:r>
-              <a:rPr lang="da-DK" dirty="0" err="1" smtClean="0"/>
-              <a:t>update</a:t>
-            </a:r>
-            <a:r>
-              <a:rPr lang="da-DK" dirty="0" smtClean="0"/>
-              <a:t> </a:t>
-            </a:r>
-            <a:r>
-              <a:rPr lang="da-DK" dirty="0" err="1" smtClean="0"/>
-              <a:t>trigger</a:t>
-            </a:r>
-            <a:r>
-              <a:rPr lang="da-DK" smtClean="0"/>
-              <a:t>)</a:t>
+              <a:t>Test DB</a:t>
             </a:r>
             <a:endParaRPr lang="da-DK" dirty="0"/>
           </a:p>
@@ -4067,8 +4052,13 @@
             </a:r>
             <a:r>
               <a:rPr lang="en-US" sz="1600" dirty="0" smtClean="0"/>
-              <a:t> between 1 and 15 times and in each order is between 1 and 10 products</a:t>
-            </a:r>
+              <a:t> between 1 and 15 times and in each order is between 1 and 10 </a:t>
+            </a:r>
+            <a:r>
+              <a:rPr lang="en-US" sz="1600" dirty="0" smtClean="0"/>
+              <a:t>products</a:t>
+            </a:r>
+            <a:endParaRPr lang="en-US" sz="1600" dirty="0" smtClean="0"/>
           </a:p>
           <a:p>
             <a:r>
@@ -4092,8 +4082,13 @@
             </a:r>
             <a:r>
               <a:rPr lang="en-US" sz="1600" dirty="0" smtClean="0"/>
-              <a:t> carries between 1000 and 10000 products</a:t>
-            </a:r>
+              <a:t> carries between 1000 and 10000 </a:t>
+            </a:r>
+            <a:r>
+              <a:rPr lang="en-US" sz="1600" dirty="0" smtClean="0"/>
+              <a:t>products</a:t>
+            </a:r>
+            <a:endParaRPr lang="en-US" sz="1600" dirty="0" smtClean="0"/>
           </a:p>
           <a:p>
             <a:r>
@@ -4106,19 +4101,48 @@
             </a:r>
             <a:r>
               <a:rPr lang="en-US" sz="1600" dirty="0" smtClean="0"/>
-              <a:t> has between 50 and 10000 customers</a:t>
-            </a:r>
-          </a:p>
-          <a:p>
+              <a:t> has between 50 and </a:t>
+            </a:r>
             <a:r>
               <a:rPr lang="en-US" sz="1600" dirty="0" smtClean="0"/>
-              <a:t>Each customer has purchased between 0 and 100 products</a:t>
-            </a:r>
+              <a:t>1000 customers</a:t>
+            </a:r>
+            <a:endParaRPr lang="en-US" sz="1600" dirty="0" smtClean="0"/>
           </a:p>
           <a:p>
             <a:r>
               <a:rPr lang="en-US" sz="1600" dirty="0" smtClean="0"/>
-              <a:t>Each order from the customer consists of between 1 and 10 products.</a:t>
+              <a:t>Each customer has purchased between 0 and 100 </a:t>
+            </a:r>
+            <a:r>
+              <a:rPr lang="en-US" sz="1600" dirty="0" smtClean="0"/>
+              <a:t>products</a:t>
+            </a:r>
+            <a:r>
+              <a:rPr lang="en-US" sz="1600" dirty="0" smtClean="0"/>
+              <a:t>.</a:t>
+            </a:r>
+            <a:endParaRPr lang="en-US" sz="1600" dirty="0" smtClean="0"/>
+          </a:p>
+          <a:p>
+            <a:r>
+              <a:rPr lang="en-US" sz="1600" dirty="0" smtClean="0"/>
+              <a:t>Each order from the customer consists of between 1 and 10 </a:t>
+            </a:r>
+            <a:r>
+              <a:rPr lang="en-US" sz="1600" smtClean="0"/>
+              <a:t>products</a:t>
+            </a:r>
+            <a:r>
+              <a:rPr lang="en-US" sz="1600" smtClean="0"/>
+              <a:t>.</a:t>
+            </a:r>
+            <a:endParaRPr lang="en-US" sz="1600" dirty="0" smtClean="0"/>
+          </a:p>
+          <a:p>
+            <a:r>
+              <a:rPr lang="en-US" sz="1600" dirty="0" smtClean="0"/>
+              <a:t>Each product is purchased in a quantity of 1 to 3 units</a:t>
             </a:r>
             <a:endParaRPr lang="da-DK" sz="1600" dirty="0"/>
           </a:p>
@@ -4133,6 +4157,288 @@
 </file>
 
 <file path=ppt/slides/slide4.xml><?xml version="1.0" encoding="utf-8"?>
+<p:sld xmlns:a="http://schemas.openxmlformats.org/drawingml/2006/main" xmlns:r="http://schemas.openxmlformats.org/officeDocument/2006/relationships" xmlns:p="http://schemas.openxmlformats.org/presentationml/2006/main">
+  <p:cSld>
+    <p:spTree>
+      <p:nvGrpSpPr>
+        <p:cNvPr id="1" name=""/>
+        <p:cNvGrpSpPr/>
+        <p:nvPr/>
+      </p:nvGrpSpPr>
+      <p:grpSpPr>
+        <a:xfrm>
+          <a:off x="0" y="0"/>
+          <a:ext cx="0" cy="0"/>
+          <a:chOff x="0" y="0"/>
+          <a:chExt cx="0" cy="0"/>
+        </a:xfrm>
+      </p:grpSpPr>
+      <p:sp>
+        <p:nvSpPr>
+          <p:cNvPr id="2" name="Titel 1"/>
+          <p:cNvSpPr>
+            <a:spLocks noGrp="1"/>
+          </p:cNvSpPr>
+          <p:nvPr>
+            <p:ph type="title"/>
+          </p:nvPr>
+        </p:nvSpPr>
+        <p:spPr/>
+        <p:txBody>
+          <a:bodyPr/>
+          <a:lstStyle/>
+          <a:p>
+            <a:r>
+              <a:rPr lang="da-DK" dirty="0" smtClean="0"/>
+              <a:t>Test DB</a:t>
+            </a:r>
+            <a:endParaRPr lang="da-DK" dirty="0"/>
+          </a:p>
+        </p:txBody>
+      </p:sp>
+      <p:sp>
+        <p:nvSpPr>
+          <p:cNvPr id="3" name="Pladsholder til indhold 2"/>
+          <p:cNvSpPr>
+            <a:spLocks noGrp="1"/>
+          </p:cNvSpPr>
+          <p:nvPr>
+            <p:ph idx="1"/>
+          </p:nvPr>
+        </p:nvSpPr>
+        <p:spPr/>
+        <p:txBody>
+          <a:bodyPr>
+            <a:normAutofit/>
+          </a:bodyPr>
+          <a:lstStyle/>
+          <a:p>
+            <a:r>
+              <a:rPr lang="da-DK" dirty="0" err="1" smtClean="0"/>
+              <a:t>Cheat</a:t>
+            </a:r>
+            <a:r>
+              <a:rPr lang="da-DK" dirty="0" smtClean="0"/>
+              <a:t> </a:t>
+            </a:r>
+            <a:r>
+              <a:rPr lang="da-DK" dirty="0" err="1" smtClean="0"/>
+              <a:t>trigger</a:t>
+            </a:r>
+            <a:r>
+              <a:rPr lang="da-DK" dirty="0" smtClean="0"/>
+              <a:t> by single </a:t>
+            </a:r>
+            <a:r>
+              <a:rPr lang="da-DK" dirty="0" err="1" smtClean="0"/>
+              <a:t>order</a:t>
+            </a:r>
+            <a:r>
+              <a:rPr lang="da-DK" dirty="0" smtClean="0"/>
+              <a:t> </a:t>
+            </a:r>
+            <a:r>
+              <a:rPr lang="da-DK" dirty="0" err="1" smtClean="0"/>
+              <a:t>insert</a:t>
+            </a:r>
+            <a:r>
+              <a:rPr lang="da-DK" dirty="0" smtClean="0"/>
+              <a:t> and manual </a:t>
+            </a:r>
+            <a:r>
+              <a:rPr lang="da-DK" dirty="0" err="1" smtClean="0"/>
+              <a:t>calc</a:t>
+            </a:r>
+            <a:r>
+              <a:rPr lang="da-DK" dirty="0" smtClean="0"/>
+              <a:t> </a:t>
+            </a:r>
+            <a:r>
+              <a:rPr lang="da-DK" dirty="0" err="1" smtClean="0"/>
+              <a:t>count</a:t>
+            </a:r>
+            <a:r>
+              <a:rPr lang="da-DK" dirty="0" smtClean="0"/>
+              <a:t>.</a:t>
+            </a:r>
+          </a:p>
+          <a:p>
+            <a:pPr lvl="1"/>
+            <a:r>
+              <a:rPr lang="da-DK" dirty="0" err="1" smtClean="0"/>
+              <a:t>Update</a:t>
+            </a:r>
+            <a:r>
+              <a:rPr lang="da-DK" dirty="0" smtClean="0"/>
+              <a:t> </a:t>
+            </a:r>
+            <a:r>
+              <a:rPr lang="da-DK" dirty="0" err="1" smtClean="0"/>
+              <a:t>exec</a:t>
+            </a:r>
+            <a:r>
+              <a:rPr lang="da-DK" dirty="0" smtClean="0"/>
+              <a:t> &gt; 1 </a:t>
+            </a:r>
+            <a:r>
+              <a:rPr lang="da-DK" dirty="0" err="1" smtClean="0"/>
+              <a:t>hour</a:t>
+            </a:r>
+            <a:endParaRPr lang="da-DK" dirty="0" smtClean="0"/>
+          </a:p>
+          <a:p>
+            <a:r>
+              <a:rPr lang="da-DK" dirty="0" smtClean="0"/>
+              <a:t>C# program (450 </a:t>
+            </a:r>
+            <a:r>
+              <a:rPr lang="da-DK" dirty="0" err="1" smtClean="0"/>
+              <a:t>linier</a:t>
+            </a:r>
+            <a:r>
+              <a:rPr lang="da-DK" dirty="0" smtClean="0"/>
+              <a:t>) – besværligt</a:t>
+            </a:r>
+          </a:p>
+          <a:p>
+            <a:r>
+              <a:rPr lang="da-DK" dirty="0" smtClean="0"/>
+              <a:t>130</a:t>
+            </a:r>
+            <a:r>
+              <a:rPr lang="da-DK" dirty="0" smtClean="0"/>
+              <a:t> </a:t>
+            </a:r>
+            <a:r>
+              <a:rPr lang="da-DK" dirty="0" smtClean="0"/>
+              <a:t>MB tekst fil </a:t>
+            </a:r>
+            <a:r>
+              <a:rPr lang="da-DK" dirty="0" smtClean="0"/>
+              <a:t>(</a:t>
+            </a:r>
+            <a:r>
+              <a:rPr lang="da-DK" dirty="0" smtClean="0"/>
+              <a:t>43</a:t>
+            </a:r>
+            <a:r>
+              <a:rPr lang="da-DK" dirty="0" smtClean="0"/>
+              <a:t>MB </a:t>
+            </a:r>
+            <a:r>
+              <a:rPr lang="da-DK" dirty="0" err="1" smtClean="0"/>
+              <a:t>zip</a:t>
+            </a:r>
+            <a:r>
+              <a:rPr lang="da-DK" dirty="0" smtClean="0"/>
+              <a:t>)</a:t>
+            </a:r>
+          </a:p>
+          <a:p>
+            <a:r>
+              <a:rPr lang="da-DK" dirty="0" err="1" smtClean="0"/>
+              <a:t>Execution</a:t>
+            </a:r>
+            <a:r>
+              <a:rPr lang="da-DK" dirty="0" smtClean="0"/>
+              <a:t> time (1 </a:t>
+            </a:r>
+            <a:r>
+              <a:rPr lang="da-DK" dirty="0" err="1" smtClean="0"/>
+              <a:t>core</a:t>
+            </a:r>
+            <a:r>
+              <a:rPr lang="da-DK" dirty="0" smtClean="0"/>
+              <a:t>): </a:t>
+            </a:r>
+            <a:r>
+              <a:rPr lang="da-DK" dirty="0" smtClean="0"/>
+              <a:t>3min and 15sec</a:t>
+            </a:r>
+            <a:endParaRPr lang="da-DK" dirty="0" smtClean="0"/>
+          </a:p>
+          <a:p>
+            <a:r>
+              <a:rPr lang="da-DK" sz="2000" dirty="0" smtClean="0"/>
+              <a:t>SELECT </a:t>
+            </a:r>
+            <a:r>
+              <a:rPr lang="da-DK" sz="2000" dirty="0" err="1" smtClean="0"/>
+              <a:t>setval</a:t>
+            </a:r>
+            <a:r>
+              <a:rPr lang="da-DK" sz="2000" dirty="0" smtClean="0"/>
+              <a:t>('</a:t>
+            </a:r>
+            <a:r>
+              <a:rPr lang="da-DK" sz="2000" dirty="0" err="1" smtClean="0"/>
+              <a:t>customerorders_orderid_seq</a:t>
+            </a:r>
+            <a:r>
+              <a:rPr lang="da-DK" sz="2000" dirty="0" smtClean="0"/>
+              <a:t>', " + (</a:t>
+            </a:r>
+            <a:r>
+              <a:rPr lang="da-DK" sz="2000" dirty="0" err="1" smtClean="0"/>
+              <a:t>startID</a:t>
+            </a:r>
+            <a:r>
+              <a:rPr lang="da-DK" sz="2000" dirty="0" smtClean="0"/>
+              <a:t> - 1) + ");</a:t>
+            </a:r>
+          </a:p>
+          <a:p>
+            <a:r>
+              <a:rPr lang="da-DK" sz="2000" dirty="0" smtClean="0"/>
+              <a:t>INSERT INTO </a:t>
+            </a:r>
+            <a:r>
+              <a:rPr lang="da-DK" sz="2000" dirty="0" err="1" smtClean="0"/>
+              <a:t>products</a:t>
+            </a:r>
+            <a:r>
+              <a:rPr lang="da-DK" sz="2000" dirty="0" smtClean="0"/>
+              <a:t> (</a:t>
+            </a:r>
+            <a:r>
+              <a:rPr lang="da-DK" sz="2000" dirty="0" err="1" smtClean="0"/>
+              <a:t>name,instock,weight</a:t>
+            </a:r>
+            <a:r>
+              <a:rPr lang="da-DK" sz="2000" dirty="0" smtClean="0"/>
+              <a:t>) VALUES ('</a:t>
+            </a:r>
+            <a:r>
+              <a:rPr lang="da-DK" sz="2000" dirty="0" err="1" smtClean="0"/>
+              <a:t>Product</a:t>
+            </a:r>
+            <a:r>
+              <a:rPr lang="da-DK" sz="2000" dirty="0" smtClean="0"/>
+              <a:t> 0',476,730),('</a:t>
+            </a:r>
+            <a:r>
+              <a:rPr lang="da-DK" sz="2000" dirty="0" err="1" smtClean="0"/>
+              <a:t>Product</a:t>
+            </a:r>
+            <a:r>
+              <a:rPr lang="da-DK" sz="2000" dirty="0" smtClean="0"/>
+              <a:t> 1',509,800),…</a:t>
+            </a:r>
+          </a:p>
+          <a:p>
+            <a:endParaRPr lang="da-DK" dirty="0"/>
+          </a:p>
+        </p:txBody>
+      </p:sp>
+    </p:spTree>
+  </p:cSld>
+  <p:clrMapOvr>
+    <a:masterClrMapping/>
+  </p:clrMapOvr>
+</p:sld>
+</file>
+
+<file path=ppt/slides/slide5.xml><?xml version="1.0" encoding="utf-8"?>
 <p:sld xmlns:a="http://schemas.openxmlformats.org/drawingml/2006/main" xmlns:r="http://schemas.openxmlformats.org/officeDocument/2006/relationships" xmlns:p="http://schemas.openxmlformats.org/presentationml/2006/main">
   <p:cSld>
     <p:spTree>
@@ -4226,7 +4532,7 @@
 </p:sld>
 </file>
 
-<file path=ppt/slides/slide5.xml><?xml version="1.0" encoding="utf-8"?>
+<file path=ppt/slides/slide6.xml><?xml version="1.0" encoding="utf-8"?>
 <p:sld xmlns:a="http://schemas.openxmlformats.org/drawingml/2006/main" xmlns:r="http://schemas.openxmlformats.org/officeDocument/2006/relationships" xmlns:p="http://schemas.openxmlformats.org/presentationml/2006/main">
   <p:cSld>
     <p:spTree>
@@ -4343,7 +4649,7 @@
 </p:sld>
 </file>
 
-<file path=ppt/slides/slide6.xml><?xml version="1.0" encoding="utf-8"?>
+<file path=ppt/slides/slide7.xml><?xml version="1.0" encoding="utf-8"?>
 <p:sld xmlns:a="http://schemas.openxmlformats.org/drawingml/2006/main" xmlns:r="http://schemas.openxmlformats.org/officeDocument/2006/relationships" xmlns:p="http://schemas.openxmlformats.org/presentationml/2006/main">
   <p:cSld>
     <p:spTree>
@@ -4436,112 +4742,6 @@
         <a:graphic>
           <a:graphicData uri="http://schemas.openxmlformats.org/presentationml/2006/ole">
             <p:oleObj spid="_x0000_s19457" name="Visio" r:id="rId3" imgW="8133588" imgH="5554963" progId="Visio.Drawing.11">
-              <p:embed/>
-            </p:oleObj>
-          </a:graphicData>
-        </a:graphic>
-      </p:graphicFrame>
-    </p:spTree>
-  </p:cSld>
-  <p:clrMapOvr>
-    <a:masterClrMapping/>
-  </p:clrMapOvr>
-</p:sld>
-</file>
-
-<file path=ppt/slides/slide7.xml><?xml version="1.0" encoding="utf-8"?>
-<p:sld xmlns:a="http://schemas.openxmlformats.org/drawingml/2006/main" xmlns:r="http://schemas.openxmlformats.org/officeDocument/2006/relationships" xmlns:p="http://schemas.openxmlformats.org/presentationml/2006/main">
-  <p:cSld>
-    <p:spTree>
-      <p:nvGrpSpPr>
-        <p:cNvPr id="1" name=""/>
-        <p:cNvGrpSpPr/>
-        <p:nvPr/>
-      </p:nvGrpSpPr>
-      <p:grpSpPr>
-        <a:xfrm>
-          <a:off x="0" y="0"/>
-          <a:ext cx="0" cy="0"/>
-          <a:chOff x="0" y="0"/>
-          <a:chExt cx="0" cy="0"/>
-        </a:xfrm>
-      </p:grpSpPr>
-      <p:sp>
-        <p:nvSpPr>
-          <p:cNvPr id="2" name="Titel 1"/>
-          <p:cNvSpPr>
-            <a:spLocks noGrp="1"/>
-          </p:cNvSpPr>
-          <p:nvPr>
-            <p:ph type="title"/>
-          </p:nvPr>
-        </p:nvSpPr>
-        <p:spPr/>
-        <p:txBody>
-          <a:bodyPr/>
-          <a:lstStyle/>
-          <a:p>
-            <a:r>
-              <a:rPr lang="da-DK" dirty="0" err="1" smtClean="0"/>
-              <a:t>PricingPLan</a:t>
-            </a:r>
-            <a:endParaRPr lang="da-DK" dirty="0"/>
-          </a:p>
-        </p:txBody>
-      </p:sp>
-      <p:sp>
-        <p:nvSpPr>
-          <p:cNvPr id="20482" name="Rectangle 2"/>
-          <p:cNvSpPr>
-            <a:spLocks noChangeArrowheads="1"/>
-          </p:cNvSpPr>
-          <p:nvPr/>
-        </p:nvSpPr>
-        <p:spPr bwMode="auto">
-          <a:xfrm>
-            <a:off x="0" y="0"/>
-            <a:ext cx="9144000" cy="0"/>
-          </a:xfrm>
-          <a:prstGeom prst="rect">
-            <a:avLst/>
-          </a:prstGeom>
-          <a:noFill/>
-          <a:ln w="9525">
-            <a:noFill/>
-            <a:miter lim="800000"/>
-            <a:headEnd/>
-            <a:tailEnd/>
-          </a:ln>
-          <a:effectLst/>
-        </p:spPr>
-        <p:txBody>
-          <a:bodyPr vert="horz" wrap="none" lIns="91440" tIns="45720" rIns="91440" bIns="45720" numCol="1" anchor="ctr" anchorCtr="0" compatLnSpc="1">
-            <a:prstTxWarp prst="textNoShape">
-              <a:avLst/>
-            </a:prstTxWarp>
-            <a:spAutoFit/>
-          </a:bodyPr>
-          <a:lstStyle/>
-          <a:p>
-            <a:endParaRPr lang="da-DK"/>
-          </a:p>
-        </p:txBody>
-      </p:sp>
-      <p:graphicFrame>
-        <p:nvGraphicFramePr>
-          <p:cNvPr id="20481" name="Object 1"/>
-          <p:cNvGraphicFramePr>
-            <a:graphicFrameLocks noChangeAspect="1"/>
-          </p:cNvGraphicFramePr>
-          <p:nvPr/>
-        </p:nvGraphicFramePr>
-        <p:xfrm>
-          <a:off x="755576" y="1268760"/>
-          <a:ext cx="7801910" cy="5040560"/>
-        </p:xfrm>
-        <a:graphic>
-          <a:graphicData uri="http://schemas.openxmlformats.org/presentationml/2006/ole">
-            <p:oleObj spid="_x0000_s20481" name="Visio" r:id="rId3" imgW="5086766" imgH="3286981" progId="Visio.Drawing.11">
               <p:embed/>
             </p:oleObj>
           </a:graphicData>
@@ -4589,6 +4789,112 @@
           <a:p>
             <a:r>
               <a:rPr lang="da-DK" dirty="0" err="1" smtClean="0"/>
+              <a:t>PricingPLan</a:t>
+            </a:r>
+            <a:endParaRPr lang="da-DK" dirty="0"/>
+          </a:p>
+        </p:txBody>
+      </p:sp>
+      <p:sp>
+        <p:nvSpPr>
+          <p:cNvPr id="20482" name="Rectangle 2"/>
+          <p:cNvSpPr>
+            <a:spLocks noChangeArrowheads="1"/>
+          </p:cNvSpPr>
+          <p:nvPr/>
+        </p:nvSpPr>
+        <p:spPr bwMode="auto">
+          <a:xfrm>
+            <a:off x="0" y="0"/>
+            <a:ext cx="9144000" cy="0"/>
+          </a:xfrm>
+          <a:prstGeom prst="rect">
+            <a:avLst/>
+          </a:prstGeom>
+          <a:noFill/>
+          <a:ln w="9525">
+            <a:noFill/>
+            <a:miter lim="800000"/>
+            <a:headEnd/>
+            <a:tailEnd/>
+          </a:ln>
+          <a:effectLst/>
+        </p:spPr>
+        <p:txBody>
+          <a:bodyPr vert="horz" wrap="none" lIns="91440" tIns="45720" rIns="91440" bIns="45720" numCol="1" anchor="ctr" anchorCtr="0" compatLnSpc="1">
+            <a:prstTxWarp prst="textNoShape">
+              <a:avLst/>
+            </a:prstTxWarp>
+            <a:spAutoFit/>
+          </a:bodyPr>
+          <a:lstStyle/>
+          <a:p>
+            <a:endParaRPr lang="da-DK"/>
+          </a:p>
+        </p:txBody>
+      </p:sp>
+      <p:graphicFrame>
+        <p:nvGraphicFramePr>
+          <p:cNvPr id="20481" name="Object 1"/>
+          <p:cNvGraphicFramePr>
+            <a:graphicFrameLocks noChangeAspect="1"/>
+          </p:cNvGraphicFramePr>
+          <p:nvPr/>
+        </p:nvGraphicFramePr>
+        <p:xfrm>
+          <a:off x="755576" y="1268760"/>
+          <a:ext cx="7801910" cy="5040560"/>
+        </p:xfrm>
+        <a:graphic>
+          <a:graphicData uri="http://schemas.openxmlformats.org/presentationml/2006/ole">
+            <p:oleObj spid="_x0000_s20481" name="Visio" r:id="rId3" imgW="5086766" imgH="3286981" progId="Visio.Drawing.11">
+              <p:embed/>
+            </p:oleObj>
+          </a:graphicData>
+        </a:graphic>
+      </p:graphicFrame>
+    </p:spTree>
+  </p:cSld>
+  <p:clrMapOvr>
+    <a:masterClrMapping/>
+  </p:clrMapOvr>
+</p:sld>
+</file>
+
+<file path=ppt/slides/slide9.xml><?xml version="1.0" encoding="utf-8"?>
+<p:sld xmlns:a="http://schemas.openxmlformats.org/drawingml/2006/main" xmlns:r="http://schemas.openxmlformats.org/officeDocument/2006/relationships" xmlns:p="http://schemas.openxmlformats.org/presentationml/2006/main">
+  <p:cSld>
+    <p:spTree>
+      <p:nvGrpSpPr>
+        <p:cNvPr id="1" name=""/>
+        <p:cNvGrpSpPr/>
+        <p:nvPr/>
+      </p:nvGrpSpPr>
+      <p:grpSpPr>
+        <a:xfrm>
+          <a:off x="0" y="0"/>
+          <a:ext cx="0" cy="0"/>
+          <a:chOff x="0" y="0"/>
+          <a:chExt cx="0" cy="0"/>
+        </a:xfrm>
+      </p:grpSpPr>
+      <p:sp>
+        <p:nvSpPr>
+          <p:cNvPr id="2" name="Titel 1"/>
+          <p:cNvSpPr>
+            <a:spLocks noGrp="1"/>
+          </p:cNvSpPr>
+          <p:nvPr>
+            <p:ph type="title"/>
+          </p:nvPr>
+        </p:nvSpPr>
+        <p:spPr/>
+        <p:txBody>
+          <a:bodyPr/>
+          <a:lstStyle/>
+          <a:p>
+            <a:r>
+              <a:rPr lang="da-DK" dirty="0" err="1" smtClean="0"/>
               <a:t>Next</a:t>
             </a:r>
             <a:r>
@@ -4761,11 +5067,7 @@
             </a:r>
             <a:r>
               <a:rPr lang="da-DK" dirty="0" smtClean="0"/>
-              <a:t> sale, </a:t>
-            </a:r>
-            <a:r>
-              <a:rPr lang="da-DK" dirty="0" smtClean="0"/>
-              <a:t>…</a:t>
+              <a:t> sale, …</a:t>
             </a:r>
           </a:p>
           <a:p>
@@ -4790,7 +5092,6 @@
               <a:rPr lang="da-DK" dirty="0" smtClean="0"/>
               <a:t>)</a:t>
             </a:r>
-            <a:endParaRPr lang="da-DK" dirty="0" smtClean="0"/>
           </a:p>
           <a:p>
             <a:r>

</xml_diff>